<commit_message>
added effectively final class
</commit_message>
<xml_diff>
--- a/slides/Java 8 - Lambda Expresssions.pptx
+++ b/slides/Java 8 - Lambda Expresssions.pptx
@@ -5847,16 +5847,7 @@
                 </a:solidFill>
                 <a:latin typeface="Lucida Bright"/>
               </a:rPr>
-              <a:t>Lambda </a:t>
-            </a:r>
-            <a:r>
-              <a:rPr lang="en-US" sz="3200" dirty="0" smtClean="0">
-                <a:solidFill>
-                  <a:srgbClr val="5C7F92"/>
-                </a:solidFill>
-                <a:latin typeface="Lucida Bright"/>
-              </a:rPr>
-              <a:t>Expressions – some rules</a:t>
+              <a:t>Lambda Expressions – some rules</a:t>
             </a:r>
             <a:endParaRPr dirty="0"/>
           </a:p>
@@ -8528,15 +8519,7 @@
                   <a:srgbClr val="3095B4"/>
                 </a:solidFill>
               </a:rPr>
-              <a:t> as an </a:t>
-            </a:r>
-            <a:r>
-              <a:rPr lang="sv-SE" sz="2000" dirty="0" smtClean="0">
-                <a:solidFill>
-                  <a:srgbClr val="3095B4"/>
-                </a:solidFill>
-              </a:rPr>
-              <a:t>argument </a:t>
+              <a:t> as an argument </a:t>
             </a:r>
             <a:r>
               <a:rPr lang="sv-SE" sz="2000" dirty="0" err="1" smtClean="0">
@@ -9157,15 +9140,7 @@
                   <a:srgbClr val="3095B4"/>
                 </a:solidFill>
               </a:rPr>
-              <a:t> as an </a:t>
-            </a:r>
-            <a:r>
-              <a:rPr lang="sv-SE" sz="2000" dirty="0" smtClean="0">
-                <a:solidFill>
-                  <a:srgbClr val="3095B4"/>
-                </a:solidFill>
-              </a:rPr>
-              <a:t>argument </a:t>
+              <a:t> as an argument </a:t>
             </a:r>
             <a:r>
               <a:rPr lang="sv-SE" sz="2000" dirty="0" err="1" smtClean="0">
@@ -9209,11 +9184,6 @@
               </a:rPr>
               <a:t>: Lambda Expressions</a:t>
             </a:r>
-            <a:endParaRPr lang="sv-SE" sz="2000" dirty="0" smtClean="0">
-              <a:solidFill>
-                <a:srgbClr val="3095B4"/>
-              </a:solidFill>
-            </a:endParaRPr>
           </a:p>
           <a:p>
             <a:pPr>

</xml_diff>

<commit_message>
added a  new NetworkAppAll
</commit_message>
<xml_diff>
--- a/slides/Java 8 - Lambda Expresssions.pptx
+++ b/slides/Java 8 - Lambda Expresssions.pptx
@@ -9339,153 +9339,21 @@
               </a:lnSpc>
             </a:pPr>
             <a:r>
-              <a:rPr lang="sv-SE" sz="2000" dirty="0">
-                <a:solidFill>
-                  <a:srgbClr val="3095B4"/>
-                </a:solidFill>
-                <a:hlinkClick r:id="rId2"/>
-              </a:rPr>
-              <a:t>http://docs.oracle.com/</a:t>
-            </a:r>
-            <a:r>
-              <a:rPr lang="sv-SE" sz="2000" dirty="0" err="1">
-                <a:solidFill>
-                  <a:srgbClr val="3095B4"/>
-                </a:solidFill>
-                <a:hlinkClick r:id="rId2"/>
-              </a:rPr>
-              <a:t>javafx</a:t>
-            </a:r>
-            <a:r>
-              <a:rPr lang="sv-SE" sz="2000" dirty="0">
-                <a:solidFill>
-                  <a:srgbClr val="3095B4"/>
-                </a:solidFill>
-                <a:hlinkClick r:id="rId2"/>
-              </a:rPr>
-              <a:t>/2/</a:t>
-            </a:r>
-            <a:r>
-              <a:rPr lang="sv-SE" sz="2000" dirty="0" err="1">
-                <a:solidFill>
-                  <a:srgbClr val="3095B4"/>
-                </a:solidFill>
-                <a:hlinkClick r:id="rId2"/>
-              </a:rPr>
-              <a:t>api</a:t>
-            </a:r>
-            <a:r>
-              <a:rPr lang="sv-SE" sz="2000" dirty="0">
-                <a:solidFill>
-                  <a:srgbClr val="3095B4"/>
-                </a:solidFill>
-                <a:hlinkClick r:id="rId2"/>
-              </a:rPr>
-              <a:t>/</a:t>
-            </a:r>
-            <a:r>
-              <a:rPr lang="sv-SE" sz="2000" dirty="0" err="1">
-                <a:solidFill>
-                  <a:srgbClr val="3095B4"/>
-                </a:solidFill>
-                <a:hlinkClick r:id="rId2"/>
-              </a:rPr>
-              <a:t>javafx</a:t>
-            </a:r>
-            <a:r>
-              <a:rPr lang="sv-SE" sz="2000" dirty="0">
-                <a:solidFill>
-                  <a:srgbClr val="3095B4"/>
-                </a:solidFill>
-                <a:hlinkClick r:id="rId2"/>
-              </a:rPr>
-              <a:t>/</a:t>
-            </a:r>
-            <a:r>
-              <a:rPr lang="sv-SE" sz="2000" dirty="0" err="1">
-                <a:solidFill>
-                  <a:srgbClr val="3095B4"/>
-                </a:solidFill>
-                <a:hlinkClick r:id="rId2"/>
-              </a:rPr>
-              <a:t>scene</a:t>
-            </a:r>
-            <a:r>
-              <a:rPr lang="sv-SE" sz="2000" dirty="0">
-                <a:solidFill>
-                  <a:srgbClr val="3095B4"/>
-                </a:solidFill>
-                <a:hlinkClick r:id="rId2"/>
-              </a:rPr>
-              <a:t>/</a:t>
-            </a:r>
-            <a:r>
-              <a:rPr lang="sv-SE" sz="2000" dirty="0" err="1">
-                <a:solidFill>
-                  <a:srgbClr val="3095B4"/>
-                </a:solidFill>
-                <a:hlinkClick r:id="rId2"/>
-              </a:rPr>
-              <a:t>control</a:t>
-            </a:r>
-            <a:r>
-              <a:rPr lang="sv-SE" sz="2000" dirty="0">
-                <a:solidFill>
-                  <a:srgbClr val="3095B4"/>
-                </a:solidFill>
-                <a:hlinkClick r:id="rId2"/>
-              </a:rPr>
-              <a:t>/</a:t>
-            </a:r>
-            <a:r>
-              <a:rPr lang="sv-SE" sz="2000" dirty="0" err="1">
-                <a:solidFill>
-                  <a:srgbClr val="3095B4"/>
-                </a:solidFill>
-                <a:hlinkClick r:id="rId2"/>
-              </a:rPr>
-              <a:t>ButtonBase.html#setOnAction</a:t>
-            </a:r>
-            <a:r>
-              <a:rPr lang="sv-SE" sz="2000" dirty="0">
-                <a:solidFill>
-                  <a:srgbClr val="3095B4"/>
-                </a:solidFill>
-                <a:hlinkClick r:id="rId2"/>
-              </a:rPr>
-              <a:t>(</a:t>
-            </a:r>
-            <a:r>
-              <a:rPr lang="sv-SE" sz="2000" dirty="0" err="1">
-                <a:solidFill>
-                  <a:srgbClr val="3095B4"/>
-                </a:solidFill>
-                <a:hlinkClick r:id="rId2"/>
-              </a:rPr>
-              <a:t>javafx.event.EventHandler</a:t>
-            </a:r>
-            <a:r>
               <a:rPr lang="sv-SE" sz="2000" dirty="0" smtClean="0">
                 <a:solidFill>
                   <a:srgbClr val="3095B4"/>
                 </a:solidFill>
-                <a:hlinkClick r:id="rId2"/>
-              </a:rPr>
-              <a:t>)</a:t>
-            </a:r>
-            <a:endParaRPr lang="sv-SE" sz="2000" dirty="0" smtClean="0">
-              <a:solidFill>
-                <a:srgbClr val="3095B4"/>
-              </a:solidFill>
-            </a:endParaRPr>
-          </a:p>
-          <a:p>
-            <a:pPr>
-              <a:lnSpc>
-                <a:spcPct val="100000"/>
-              </a:lnSpc>
-            </a:pPr>
-            <a:endParaRPr sz="2000" dirty="0">
+              </a:rPr>
+              <a:t>http://docs.oracle.com/javafx/2/api/javafx/scene/control/ButtonBase.html#setOnAction(javafx.event.EventHandler</a:t>
+            </a:r>
+          </a:p>
+          <a:p>
+            <a:pPr>
+              <a:lnSpc>
+                <a:spcPct val="100000"/>
+              </a:lnSpc>
+            </a:pPr>
+            <a:endParaRPr sz="2000" dirty="0" smtClean="0">
               <a:solidFill>
                 <a:srgbClr val="3095B4"/>
               </a:solidFill>

</xml_diff>

<commit_message>
some minor changes for lambda expressions
</commit_message>
<xml_diff>
--- a/slides/Java 8 - Lambda Expresssions.pptx
+++ b/slides/Java 8 - Lambda Expresssions.pptx
@@ -3458,21 +3458,8 @@
                   <a:srgbClr val="3095B4"/>
                 </a:solidFill>
               </a:rPr>
-              <a:t>Task </a:t>
-            </a:r>
-            <a:r>
-              <a:rPr lang="en-US" sz="2000" dirty="0" smtClean="0">
-                <a:solidFill>
-                  <a:srgbClr val="3095B4"/>
-                </a:solidFill>
-              </a:rPr>
-              <a:t>3</a:t>
-            </a:r>
-            <a:endParaRPr lang="en-US" sz="2000" dirty="0" smtClean="0">
-              <a:solidFill>
-                <a:srgbClr val="3095B4"/>
-              </a:solidFill>
-            </a:endParaRPr>
+              <a:t>Task 3</a:t>
+            </a:r>
           </a:p>
           <a:p>
             <a:pPr>
@@ -3667,16 +3654,15 @@
                   <a:srgbClr val="3095B4"/>
                 </a:solidFill>
               </a:rPr>
-              <a:t>Task </a:t>
-            </a:r>
-            <a:r>
-              <a:rPr lang="en-US" sz="2000" dirty="0" smtClean="0">
-                <a:solidFill>
-                  <a:srgbClr val="3095B4"/>
-                </a:solidFill>
-              </a:rPr>
-              <a:t>3</a:t>
-            </a:r>
+              <a:t>Task 3</a:t>
+            </a:r>
+          </a:p>
+          <a:p>
+            <a:pPr>
+              <a:lnSpc>
+                <a:spcPct val="100000"/>
+              </a:lnSpc>
+            </a:pPr>
             <a:endParaRPr lang="en-US" sz="2000" dirty="0" smtClean="0">
               <a:solidFill>
                 <a:srgbClr val="3095B4"/>
@@ -3684,18 +3670,6 @@
             </a:endParaRPr>
           </a:p>
           <a:p>
-            <a:pPr>
-              <a:lnSpc>
-                <a:spcPct val="100000"/>
-              </a:lnSpc>
-            </a:pPr>
-            <a:endParaRPr lang="en-US" sz="2000" dirty="0" smtClean="0">
-              <a:solidFill>
-                <a:srgbClr val="3095B4"/>
-              </a:solidFill>
-            </a:endParaRPr>
-          </a:p>
-          <a:p>
             <a:pPr marL="457200" indent="-457200">
               <a:buAutoNum type="arabicPeriod"/>
             </a:pPr>
@@ -3707,11 +3681,6 @@
               </a:rPr>
               <a:t>We are still in test class. Create a lambda expression.</a:t>
             </a:r>
-            <a:endParaRPr lang="en-US" sz="2000" dirty="0" smtClean="0">
-              <a:solidFill>
-                <a:srgbClr val="3095B4"/>
-              </a:solidFill>
-            </a:endParaRPr>
           </a:p>
           <a:p>
             <a:pPr marL="457200" indent="-457200">
@@ -3911,23 +3880,7 @@
                   <a:srgbClr val="3095B4"/>
                 </a:solidFill>
               </a:rPr>
-              <a:t>Task </a:t>
-            </a:r>
-            <a:r>
-              <a:rPr lang="en-US" sz="2000" dirty="0" smtClean="0">
-                <a:solidFill>
-                  <a:srgbClr val="3095B4"/>
-                </a:solidFill>
-              </a:rPr>
-              <a:t>4 </a:t>
-            </a:r>
-            <a:r>
-              <a:rPr lang="en-US" sz="2000" dirty="0" smtClean="0">
-                <a:solidFill>
-                  <a:srgbClr val="3095B4"/>
-                </a:solidFill>
-              </a:rPr>
-              <a:t>Replace your interface with an existing one</a:t>
+              <a:t>Task 4 Replace your interface with an existing one</a:t>
             </a:r>
           </a:p>
           <a:p>
@@ -4031,6 +3984,41 @@
               </a:rPr>
               <a:t>}</a:t>
             </a:r>
+          </a:p>
+          <a:p>
+            <a:pPr lvl="1"/>
+            <a:endParaRPr lang="en-US" sz="2000" dirty="0">
+              <a:solidFill>
+                <a:srgbClr val="3095B4"/>
+              </a:solidFill>
+            </a:endParaRPr>
+          </a:p>
+          <a:p>
+            <a:pPr lvl="1"/>
+            <a:endParaRPr lang="en-US" sz="2000" dirty="0" smtClean="0">
+              <a:solidFill>
+                <a:srgbClr val="3095B4"/>
+              </a:solidFill>
+            </a:endParaRPr>
+          </a:p>
+          <a:p>
+            <a:pPr lvl="1"/>
+            <a:r>
+              <a:rPr lang="sv-SE" sz="2000" dirty="0">
+                <a:hlinkClick r:id="rId2"/>
+              </a:rPr>
+              <a:t>http://download.java.net/jdk8/docs/api</a:t>
+            </a:r>
+            <a:r>
+              <a:rPr lang="sv-SE" sz="2000" dirty="0" smtClean="0">
+                <a:hlinkClick r:id="rId2"/>
+              </a:rPr>
+              <a:t>/</a:t>
+            </a:r>
+            <a:endParaRPr lang="sv-SE" sz="2000" dirty="0" smtClean="0"/>
+          </a:p>
+          <a:p>
+            <a:pPr lvl="1"/>
             <a:endParaRPr lang="en-US" sz="2000" dirty="0">
               <a:solidFill>
                 <a:srgbClr val="3095B4"/>
@@ -4177,23 +4165,7 @@
                   <a:srgbClr val="3095B4"/>
                 </a:solidFill>
               </a:rPr>
-              <a:t>Task </a:t>
-            </a:r>
-            <a:r>
-              <a:rPr lang="en-US" sz="2000" dirty="0" smtClean="0">
-                <a:solidFill>
-                  <a:srgbClr val="3095B4"/>
-                </a:solidFill>
-              </a:rPr>
-              <a:t>4 </a:t>
-            </a:r>
-            <a:r>
-              <a:rPr lang="en-US" sz="2000" dirty="0" smtClean="0">
-                <a:solidFill>
-                  <a:srgbClr val="3095B4"/>
-                </a:solidFill>
-              </a:rPr>
-              <a:t>This is a good one</a:t>
+              <a:t>Task 4 This is a good one</a:t>
             </a:r>
           </a:p>
           <a:p>
@@ -4649,31 +4621,7 @@
                   <a:srgbClr val="3095B4"/>
                 </a:solidFill>
               </a:rPr>
-              <a:t>Task </a:t>
-            </a:r>
-            <a:r>
-              <a:rPr lang="en-US" sz="2000" dirty="0" smtClean="0">
-                <a:solidFill>
-                  <a:srgbClr val="3095B4"/>
-                </a:solidFill>
-              </a:rPr>
-              <a:t>5 </a:t>
-            </a:r>
-            <a:r>
-              <a:rPr lang="en-US" sz="2000" dirty="0" smtClean="0">
-                <a:solidFill>
-                  <a:srgbClr val="3095B4"/>
-                </a:solidFill>
-              </a:rPr>
-              <a:t>Could we replace more code with Lambda Expressions</a:t>
-            </a:r>
-            <a:r>
-              <a:rPr lang="en-US" sz="2000" dirty="0" smtClean="0">
-                <a:solidFill>
-                  <a:srgbClr val="3095B4"/>
-                </a:solidFill>
-              </a:rPr>
-              <a:t>?</a:t>
+              <a:t>Task 5 Could we replace more code with Lambda Expressions?</a:t>
             </a:r>
           </a:p>
           <a:p>
@@ -4749,11 +4697,6 @@
               </a:rPr>
               <a:t>Add a new existing function interface as parameter.</a:t>
             </a:r>
-            <a:endParaRPr lang="en-US" sz="2000" dirty="0" smtClean="0">
-              <a:solidFill>
-                <a:srgbClr val="3095B4"/>
-              </a:solidFill>
-            </a:endParaRPr>
           </a:p>
           <a:p>
             <a:pPr>
@@ -4907,15 +4850,7 @@
                   <a:srgbClr val="3095B4"/>
                 </a:solidFill>
               </a:rPr>
-              <a:t>Task </a:t>
-            </a:r>
-            <a:r>
-              <a:rPr lang="en-US" sz="2000" dirty="0" smtClean="0">
-                <a:solidFill>
-                  <a:srgbClr val="3095B4"/>
-                </a:solidFill>
-              </a:rPr>
-              <a:t>5 </a:t>
+              <a:t>Task 5 </a:t>
             </a:r>
           </a:p>
           <a:p>
@@ -4971,11 +4906,6 @@
               </a:rPr>
               <a:t>Consumer</a:t>
             </a:r>
-            <a:endParaRPr lang="en-US" sz="2000" dirty="0" smtClean="0">
-              <a:solidFill>
-                <a:srgbClr val="3095B4"/>
-              </a:solidFill>
-            </a:endParaRPr>
           </a:p>
           <a:p>
             <a:pPr>
@@ -5001,15 +4931,7 @@
                   <a:srgbClr val="3095B4"/>
                 </a:solidFill>
               </a:rPr>
-              <a:t>T-&gt; </a:t>
-            </a:r>
-            <a:r>
-              <a:rPr lang="en-US" sz="2000" dirty="0" smtClean="0">
-                <a:solidFill>
-                  <a:srgbClr val="3095B4"/>
-                </a:solidFill>
-              </a:rPr>
-              <a:t>void</a:t>
+              <a:t>T-&gt; void</a:t>
             </a:r>
           </a:p>
           <a:p>
@@ -8862,7 +8784,15 @@
                   <a:srgbClr val="3095B4"/>
                 </a:solidFill>
               </a:rPr>
-              <a:t> is not a </a:t>
+              <a:t> is </a:t>
+            </a:r>
+            <a:r>
+              <a:rPr lang="sv-SE" sz="2000" dirty="0" smtClean="0">
+                <a:solidFill>
+                  <a:srgbClr val="3095B4"/>
+                </a:solidFill>
+              </a:rPr>
+              <a:t>not </a:t>
             </a:r>
             <a:r>
               <a:rPr lang="sv-SE" sz="2000" dirty="0" err="1" smtClean="0">
@@ -8878,7 +8808,15 @@
                   <a:srgbClr val="3095B4"/>
                 </a:solidFill>
               </a:rPr>
-              <a:t> design </a:t>
+              <a:t> </a:t>
+            </a:r>
+            <a:r>
+              <a:rPr lang="sv-SE" sz="2000" dirty="0" smtClean="0">
+                <a:solidFill>
+                  <a:srgbClr val="3095B4"/>
+                </a:solidFill>
+              </a:rPr>
+              <a:t>design </a:t>
             </a:r>
             <a:r>
               <a:rPr lang="sv-SE" sz="2000" dirty="0" err="1" smtClean="0">
@@ -8918,7 +8856,7 @@
                   <a:srgbClr val="3095B4"/>
                 </a:solidFill>
               </a:rPr>
-              <a:t>mehtod</a:t>
+              <a:t>method</a:t>
             </a:r>
             <a:r>
               <a:rPr lang="sv-SE" sz="2000" dirty="0" smtClean="0">
@@ -8926,7 +8864,15 @@
                   <a:srgbClr val="3095B4"/>
                 </a:solidFill>
               </a:rPr>
-              <a:t> for </a:t>
+              <a:t> </a:t>
+            </a:r>
+            <a:r>
+              <a:rPr lang="sv-SE" sz="2000" dirty="0" smtClean="0">
+                <a:solidFill>
+                  <a:srgbClr val="3095B4"/>
+                </a:solidFill>
+              </a:rPr>
+              <a:t>for </a:t>
             </a:r>
             <a:r>
               <a:rPr lang="sv-SE" sz="2000" dirty="0" err="1" smtClean="0">
@@ -8987,11 +8933,6 @@
               </a:rPr>
               <a:t>Solution?</a:t>
             </a:r>
-            <a:endParaRPr lang="sv-SE" sz="2000" dirty="0" smtClean="0">
-              <a:solidFill>
-                <a:srgbClr val="3095B4"/>
-              </a:solidFill>
-            </a:endParaRPr>
           </a:p>
           <a:p>
             <a:pPr>

</xml_diff>